<commit_message>
update slide dos parametros
</commit_message>
<xml_diff>
--- a/docs/Checkpoint3 IART.pptx
+++ b/docs/Checkpoint3 IART.pptx
@@ -250,7 +250,7 @@
           <a:p>
             <a:fld id="{846CE7D5-CF57-46EF-B807-FDD0502418D4}" type="datetimeFigureOut">
               <a:rPr lang="en-US" smtClean="0"/>
-              <a:t>5/23/21</a:t>
+              <a:t>5/26/21</a:t>
             </a:fld>
             <a:endParaRPr lang="en-US"/>
           </a:p>
@@ -418,7 +418,7 @@
           <a:p>
             <a:fld id="{846CE7D5-CF57-46EF-B807-FDD0502418D4}" type="datetimeFigureOut">
               <a:rPr lang="en-US" smtClean="0"/>
-              <a:t>5/23/21</a:t>
+              <a:t>5/26/21</a:t>
             </a:fld>
             <a:endParaRPr lang="en-US"/>
           </a:p>
@@ -596,7 +596,7 @@
           <a:p>
             <a:fld id="{846CE7D5-CF57-46EF-B807-FDD0502418D4}" type="datetimeFigureOut">
               <a:rPr lang="en-US" smtClean="0"/>
-              <a:t>5/23/21</a:t>
+              <a:t>5/26/21</a:t>
             </a:fld>
             <a:endParaRPr lang="en-US"/>
           </a:p>
@@ -764,7 +764,7 @@
           <a:p>
             <a:fld id="{846CE7D5-CF57-46EF-B807-FDD0502418D4}" type="datetimeFigureOut">
               <a:rPr lang="en-US" smtClean="0"/>
-              <a:t>5/23/21</a:t>
+              <a:t>5/26/21</a:t>
             </a:fld>
             <a:endParaRPr lang="en-US"/>
           </a:p>
@@ -1009,7 +1009,7 @@
           <a:p>
             <a:fld id="{846CE7D5-CF57-46EF-B807-FDD0502418D4}" type="datetimeFigureOut">
               <a:rPr lang="en-US" smtClean="0"/>
-              <a:t>5/23/21</a:t>
+              <a:t>5/26/21</a:t>
             </a:fld>
             <a:endParaRPr lang="en-US"/>
           </a:p>
@@ -1238,7 +1238,7 @@
           <a:p>
             <a:fld id="{846CE7D5-CF57-46EF-B807-FDD0502418D4}" type="datetimeFigureOut">
               <a:rPr lang="en-US" smtClean="0"/>
-              <a:t>5/23/21</a:t>
+              <a:t>5/26/21</a:t>
             </a:fld>
             <a:endParaRPr lang="en-US"/>
           </a:p>
@@ -1602,7 +1602,7 @@
           <a:p>
             <a:fld id="{846CE7D5-CF57-46EF-B807-FDD0502418D4}" type="datetimeFigureOut">
               <a:rPr lang="en-US" smtClean="0"/>
-              <a:t>5/23/21</a:t>
+              <a:t>5/26/21</a:t>
             </a:fld>
             <a:endParaRPr lang="en-US"/>
           </a:p>
@@ -1719,7 +1719,7 @@
           <a:p>
             <a:fld id="{846CE7D5-CF57-46EF-B807-FDD0502418D4}" type="datetimeFigureOut">
               <a:rPr lang="en-US" smtClean="0"/>
-              <a:t>5/23/21</a:t>
+              <a:t>5/26/21</a:t>
             </a:fld>
             <a:endParaRPr lang="en-US"/>
           </a:p>
@@ -1814,7 +1814,7 @@
           <a:p>
             <a:fld id="{846CE7D5-CF57-46EF-B807-FDD0502418D4}" type="datetimeFigureOut">
               <a:rPr lang="en-US" smtClean="0"/>
-              <a:t>5/23/21</a:t>
+              <a:t>5/26/21</a:t>
             </a:fld>
             <a:endParaRPr lang="en-US"/>
           </a:p>
@@ -2089,7 +2089,7 @@
           <a:p>
             <a:fld id="{846CE7D5-CF57-46EF-B807-FDD0502418D4}" type="datetimeFigureOut">
               <a:rPr lang="en-US" smtClean="0"/>
-              <a:t>5/23/21</a:t>
+              <a:t>5/26/21</a:t>
             </a:fld>
             <a:endParaRPr lang="en-US"/>
           </a:p>
@@ -2344,7 +2344,7 @@
           <a:p>
             <a:fld id="{846CE7D5-CF57-46EF-B807-FDD0502418D4}" type="datetimeFigureOut">
               <a:rPr lang="en-US" smtClean="0"/>
-              <a:t>5/23/21</a:t>
+              <a:t>5/26/21</a:t>
             </a:fld>
             <a:endParaRPr lang="en-US"/>
           </a:p>
@@ -2555,7 +2555,7 @@
           <a:p>
             <a:fld id="{846CE7D5-CF57-46EF-B807-FDD0502418D4}" type="datetimeFigureOut">
               <a:rPr lang="en-US" smtClean="0"/>
-              <a:t>5/23/21</a:t>
+              <a:t>5/26/21</a:t>
             </a:fld>
             <a:endParaRPr lang="en-US"/>
           </a:p>
@@ -5692,7 +5692,7 @@
         </p:nvSpPr>
         <p:spPr>
           <a:xfrm>
-            <a:off x="2425287" y="-12328"/>
+            <a:off x="2421700" y="135248"/>
             <a:ext cx="9770300" cy="6868437"/>
           </a:xfrm>
           <a:prstGeom prst="rect">
@@ -5947,10 +5947,10 @@
       </p:sp>
       <p:pic>
         <p:nvPicPr>
-          <p:cNvPr id="4" name="Imagem 3" descr="Uma imagem com texto&#10;&#10;Descrição gerada automaticamente">
+          <p:cNvPr id="8" name="Imagem 7" descr="Uma imagem com texto&#10;&#10;Descrição gerada automaticamente">
             <a:extLst>
               <a:ext uri="{FF2B5EF4-FFF2-40B4-BE49-F238E27FC236}">
-                <a16:creationId xmlns:a16="http://schemas.microsoft.com/office/drawing/2014/main" id="{C5936F69-D215-9E48-9AFF-768321872F70}"/>
+                <a16:creationId xmlns:a16="http://schemas.microsoft.com/office/drawing/2014/main" id="{A3A0F955-ED74-1C43-ABC8-74B571D8C195}"/>
               </a:ext>
             </a:extLst>
           </p:cNvPr>
@@ -5973,8 +5973,8 @@
         </p:blipFill>
         <p:spPr>
           <a:xfrm>
-            <a:off x="3282998" y="2513954"/>
-            <a:ext cx="8054878" cy="3196380"/>
+            <a:off x="3984889" y="2150242"/>
+            <a:ext cx="6433820" cy="2838450"/>
           </a:xfrm>
           <a:prstGeom prst="rect">
             <a:avLst/>

</xml_diff>